<commit_message>
Added pictures and formatted
</commit_message>
<xml_diff>
--- a/FinTech Coinbase slides.pptx
+++ b/FinTech Coinbase slides.pptx
@@ -202,7 +202,7 @@
           <a:p>
             <a:fld id="{04B92FBC-E979-48D1-AE6B-E420EEA137C5}" type="datetimeFigureOut">
               <a:rPr lang="en-US" smtClean="0"/>
-              <a:t>8/26/2019</a:t>
+              <a:t>9/3/2019</a:t>
             </a:fld>
             <a:endParaRPr lang="en-US"/>
           </a:p>
@@ -1381,7 +1381,7 @@
           <a:p>
             <a:fld id="{48A87A34-81AB-432B-8DAE-1953F412C126}" type="datetimeFigureOut">
               <a:rPr lang="en-US" dirty="0"/>
-              <a:t>8/26/2019</a:t>
+              <a:t>9/3/2019</a:t>
             </a:fld>
             <a:endParaRPr lang="en-US" dirty="0"/>
           </a:p>
@@ -1643,7 +1643,7 @@
           <a:p>
             <a:fld id="{48A87A34-81AB-432B-8DAE-1953F412C126}" type="datetimeFigureOut">
               <a:rPr lang="en-US" dirty="0"/>
-              <a:t>8/26/2019</a:t>
+              <a:t>9/3/2019</a:t>
             </a:fld>
             <a:endParaRPr lang="en-US" dirty="0"/>
           </a:p>
@@ -1870,7 +1870,7 @@
             <a:fld id="{48A87A34-81AB-432B-8DAE-1953F412C126}" type="datetimeFigureOut">
               <a:rPr lang="en-US" dirty="0"/>
               <a:pPr/>
-              <a:t>8/26/2019</a:t>
+              <a:t>9/3/2019</a:t>
             </a:fld>
             <a:endParaRPr lang="en-US" dirty="0"/>
           </a:p>
@@ -2176,7 +2176,7 @@
             <a:fld id="{48A87A34-81AB-432B-8DAE-1953F412C126}" type="datetimeFigureOut">
               <a:rPr lang="en-US" dirty="0"/>
               <a:pPr/>
-              <a:t>8/26/2019</a:t>
+              <a:t>9/3/2019</a:t>
             </a:fld>
             <a:endParaRPr lang="en-US" dirty="0"/>
           </a:p>
@@ -2645,7 +2645,7 @@
             <a:fld id="{48A87A34-81AB-432B-8DAE-1953F412C126}" type="datetimeFigureOut">
               <a:rPr lang="en-US" dirty="0"/>
               <a:pPr/>
-              <a:t>8/26/2019</a:t>
+              <a:t>9/3/2019</a:t>
             </a:fld>
             <a:endParaRPr lang="en-US" dirty="0"/>
           </a:p>
@@ -3187,7 +3187,7 @@
           <a:p>
             <a:fld id="{48A87A34-81AB-432B-8DAE-1953F412C126}" type="datetimeFigureOut">
               <a:rPr lang="en-US" dirty="0"/>
-              <a:t>8/26/2019</a:t>
+              <a:t>9/3/2019</a:t>
             </a:fld>
             <a:endParaRPr lang="en-US" dirty="0"/>
           </a:p>
@@ -3956,7 +3956,7 @@
           <a:p>
             <a:fld id="{48A87A34-81AB-432B-8DAE-1953F412C126}" type="datetimeFigureOut">
               <a:rPr lang="en-US" dirty="0"/>
-              <a:t>8/26/2019</a:t>
+              <a:t>9/3/2019</a:t>
             </a:fld>
             <a:endParaRPr lang="en-US" dirty="0"/>
           </a:p>
@@ -4126,7 +4126,7 @@
           <a:p>
             <a:fld id="{48A87A34-81AB-432B-8DAE-1953F412C126}" type="datetimeFigureOut">
               <a:rPr lang="en-US" dirty="0"/>
-              <a:t>8/26/2019</a:t>
+              <a:t>9/3/2019</a:t>
             </a:fld>
             <a:endParaRPr lang="en-US" dirty="0"/>
           </a:p>
@@ -4345,7 +4345,7 @@
             <a:fld id="{48A87A34-81AB-432B-8DAE-1953F412C126}" type="datetimeFigureOut">
               <a:rPr lang="en-US" dirty="0"/>
               <a:pPr/>
-              <a:t>8/26/2019</a:t>
+              <a:t>9/3/2019</a:t>
             </a:fld>
             <a:endParaRPr lang="en-US" dirty="0"/>
           </a:p>
@@ -4520,7 +4520,7 @@
           <a:p>
             <a:fld id="{48A87A34-81AB-432B-8DAE-1953F412C126}" type="datetimeFigureOut">
               <a:rPr lang="en-US" dirty="0"/>
-              <a:t>8/26/2019</a:t>
+              <a:t>9/3/2019</a:t>
             </a:fld>
             <a:endParaRPr lang="en-US" dirty="0"/>
           </a:p>
@@ -4805,7 +4805,7 @@
             <a:fld id="{48A87A34-81AB-432B-8DAE-1953F412C126}" type="datetimeFigureOut">
               <a:rPr lang="en-US" dirty="0"/>
               <a:pPr/>
-              <a:t>8/26/2019</a:t>
+              <a:t>9/3/2019</a:t>
             </a:fld>
             <a:endParaRPr lang="en-US" dirty="0"/>
           </a:p>
@@ -5042,7 +5042,7 @@
           <a:p>
             <a:fld id="{48A87A34-81AB-432B-8DAE-1953F412C126}" type="datetimeFigureOut">
               <a:rPr lang="en-US" dirty="0"/>
-              <a:t>8/26/2019</a:t>
+              <a:t>9/3/2019</a:t>
             </a:fld>
             <a:endParaRPr lang="en-US" dirty="0"/>
           </a:p>
@@ -5416,7 +5416,7 @@
           <a:p>
             <a:fld id="{48A87A34-81AB-432B-8DAE-1953F412C126}" type="datetimeFigureOut">
               <a:rPr lang="en-US" dirty="0"/>
-              <a:t>8/26/2019</a:t>
+              <a:t>9/3/2019</a:t>
             </a:fld>
             <a:endParaRPr lang="en-US" dirty="0"/>
           </a:p>
@@ -5529,7 +5529,7 @@
           <a:p>
             <a:fld id="{48A87A34-81AB-432B-8DAE-1953F412C126}" type="datetimeFigureOut">
               <a:rPr lang="en-US" dirty="0"/>
-              <a:t>8/26/2019</a:t>
+              <a:t>9/3/2019</a:t>
             </a:fld>
             <a:endParaRPr lang="en-US" dirty="0"/>
           </a:p>
@@ -5619,7 +5619,7 @@
           <a:p>
             <a:fld id="{48A87A34-81AB-432B-8DAE-1953F412C126}" type="datetimeFigureOut">
               <a:rPr lang="en-US" dirty="0"/>
-              <a:t>8/26/2019</a:t>
+              <a:t>9/3/2019</a:t>
             </a:fld>
             <a:endParaRPr lang="en-US" dirty="0"/>
           </a:p>
@@ -5863,7 +5863,7 @@
           <a:p>
             <a:fld id="{48A87A34-81AB-432B-8DAE-1953F412C126}" type="datetimeFigureOut">
               <a:rPr lang="en-US" dirty="0"/>
-              <a:t>8/26/2019</a:t>
+              <a:t>9/3/2019</a:t>
             </a:fld>
             <a:endParaRPr lang="en-US" dirty="0"/>
           </a:p>
@@ -6115,7 +6115,7 @@
           <a:p>
             <a:fld id="{48A87A34-81AB-432B-8DAE-1953F412C126}" type="datetimeFigureOut">
               <a:rPr lang="en-US" dirty="0"/>
-              <a:t>8/26/2019</a:t>
+              <a:t>9/3/2019</a:t>
             </a:fld>
             <a:endParaRPr lang="en-US" dirty="0"/>
           </a:p>
@@ -6354,7 +6354,7 @@
             <a:fld id="{48A87A34-81AB-432B-8DAE-1953F412C126}" type="datetimeFigureOut">
               <a:rPr lang="en-US" dirty="0"/>
               <a:pPr/>
-              <a:t>8/26/2019</a:t>
+              <a:t>9/3/2019</a:t>
             </a:fld>
             <a:endParaRPr lang="en-US" dirty="0"/>
           </a:p>
@@ -6817,6 +6817,53 @@
           </a:p>
         </p:txBody>
       </p:sp>
+      <p:pic>
+        <p:nvPicPr>
+          <p:cNvPr id="1026" name="Picture 2" descr="Image result for coinbase">
+            <a:extLst>
+              <a:ext uri="{FF2B5EF4-FFF2-40B4-BE49-F238E27FC236}">
+                <a16:creationId xmlns:a16="http://schemas.microsoft.com/office/drawing/2014/main" id="{F9CCBA56-EB65-4A34-822D-6F44EB602E10}"/>
+              </a:ext>
+            </a:extLst>
+          </p:cNvPr>
+          <p:cNvPicPr>
+            <a:picLocks noChangeAspect="1" noChangeArrowheads="1"/>
+          </p:cNvPicPr>
+          <p:nvPr/>
+        </p:nvPicPr>
+        <p:blipFill>
+          <a:blip r:embed="rId2">
+            <a:extLst>
+              <a:ext uri="{28A0092B-C50C-407E-A947-70E740481C1C}">
+                <a14:useLocalDpi xmlns:a14="http://schemas.microsoft.com/office/drawing/2010/main" val="0"/>
+              </a:ext>
+            </a:extLst>
+          </a:blip>
+          <a:srcRect/>
+          <a:stretch>
+            <a:fillRect/>
+          </a:stretch>
+        </p:blipFill>
+        <p:spPr bwMode="auto">
+          <a:xfrm>
+            <a:off x="6837692" y="594876"/>
+            <a:ext cx="3723125" cy="3723125"/>
+          </a:xfrm>
+          <a:prstGeom prst="rect">
+            <a:avLst/>
+          </a:prstGeom>
+          <a:noFill/>
+          <a:extLst>
+            <a:ext uri="{909E8E84-426E-40DD-AFC4-6F175D3DCCD1}">
+              <a14:hiddenFill xmlns:a14="http://schemas.microsoft.com/office/drawing/2010/main">
+                <a:solidFill>
+                  <a:srgbClr val="FFFFFF"/>
+                </a:solidFill>
+              </a14:hiddenFill>
+            </a:ext>
+          </a:extLst>
+        </p:spPr>
+      </p:pic>
     </p:spTree>
     <p:extLst>
       <p:ext uri="{BB962C8B-B14F-4D97-AF65-F5344CB8AC3E}">
@@ -6902,7 +6949,7 @@
                   <a:srgbClr val="00B0F0"/>
                 </a:solidFill>
               </a:rPr>
-              <a:t>Who are they ? </a:t>
+              <a:t>Who Are They ? </a:t>
             </a:r>
           </a:p>
           <a:p>
@@ -7072,7 +7119,7 @@
                   <a:srgbClr val="00B0F0"/>
                 </a:solidFill>
               </a:rPr>
-              <a:t>What are they trying to solve? </a:t>
+              <a:t>What Are They Trying To Solve? </a:t>
             </a:r>
           </a:p>
           <a:p>
@@ -7241,7 +7288,7 @@
             <a:pPr lvl="1"/>
             <a:r>
               <a:rPr lang="en-US" dirty="0"/>
-              <a:t> institutions entering market </a:t>
+              <a:t>Institutions entering market </a:t>
             </a:r>
           </a:p>
           <a:p>
@@ -7311,6 +7358,53 @@
           </a:p>
         </p:txBody>
       </p:sp>
+      <p:pic>
+        <p:nvPicPr>
+          <p:cNvPr id="3074" name="Picture 2" descr="Image result for bitcoin">
+            <a:extLst>
+              <a:ext uri="{FF2B5EF4-FFF2-40B4-BE49-F238E27FC236}">
+                <a16:creationId xmlns:a16="http://schemas.microsoft.com/office/drawing/2014/main" id="{CE96D66A-3698-4FEB-9C58-10E06D20D8FD}"/>
+              </a:ext>
+            </a:extLst>
+          </p:cNvPr>
+          <p:cNvPicPr>
+            <a:picLocks noChangeAspect="1" noChangeArrowheads="1"/>
+          </p:cNvPicPr>
+          <p:nvPr/>
+        </p:nvPicPr>
+        <p:blipFill>
+          <a:blip r:embed="rId3">
+            <a:extLst>
+              <a:ext uri="{28A0092B-C50C-407E-A947-70E740481C1C}">
+                <a14:useLocalDpi xmlns:a14="http://schemas.microsoft.com/office/drawing/2010/main" val="0"/>
+              </a:ext>
+            </a:extLst>
+          </a:blip>
+          <a:srcRect/>
+          <a:stretch>
+            <a:fillRect/>
+          </a:stretch>
+        </p:blipFill>
+        <p:spPr bwMode="auto">
+          <a:xfrm>
+            <a:off x="7436618" y="2408685"/>
+            <a:ext cx="3810000" cy="3810000"/>
+          </a:xfrm>
+          <a:prstGeom prst="rect">
+            <a:avLst/>
+          </a:prstGeom>
+          <a:noFill/>
+          <a:extLst>
+            <a:ext uri="{909E8E84-426E-40DD-AFC4-6F175D3DCCD1}">
+              <a14:hiddenFill xmlns:a14="http://schemas.microsoft.com/office/drawing/2010/main">
+                <a:solidFill>
+                  <a:srgbClr val="FFFFFF"/>
+                </a:solidFill>
+              </a14:hiddenFill>
+            </a:ext>
+          </a:extLst>
+        </p:spPr>
+      </p:pic>
     </p:spTree>
     <p:extLst>
       <p:ext uri="{BB962C8B-B14F-4D97-AF65-F5344CB8AC3E}">
@@ -7431,6 +7525,53 @@
           </a:p>
         </p:txBody>
       </p:sp>
+      <p:pic>
+        <p:nvPicPr>
+          <p:cNvPr id="2050" name="Picture 2" descr="Image result for coinbase">
+            <a:extLst>
+              <a:ext uri="{FF2B5EF4-FFF2-40B4-BE49-F238E27FC236}">
+                <a16:creationId xmlns:a16="http://schemas.microsoft.com/office/drawing/2014/main" id="{E3178203-EC81-4E88-953A-87D4873BD7AC}"/>
+              </a:ext>
+            </a:extLst>
+          </p:cNvPr>
+          <p:cNvPicPr>
+            <a:picLocks noChangeAspect="1" noChangeArrowheads="1"/>
+          </p:cNvPicPr>
+          <p:nvPr/>
+        </p:nvPicPr>
+        <p:blipFill>
+          <a:blip r:embed="rId3">
+            <a:extLst>
+              <a:ext uri="{28A0092B-C50C-407E-A947-70E740481C1C}">
+                <a14:useLocalDpi xmlns:a14="http://schemas.microsoft.com/office/drawing/2010/main" val="0"/>
+              </a:ext>
+            </a:extLst>
+          </a:blip>
+          <a:srcRect/>
+          <a:stretch>
+            <a:fillRect/>
+          </a:stretch>
+        </p:blipFill>
+        <p:spPr bwMode="auto">
+          <a:xfrm>
+            <a:off x="6290268" y="3610459"/>
+            <a:ext cx="5101108" cy="2865006"/>
+          </a:xfrm>
+          <a:prstGeom prst="rect">
+            <a:avLst/>
+          </a:prstGeom>
+          <a:noFill/>
+          <a:extLst>
+            <a:ext uri="{909E8E84-426E-40DD-AFC4-6F175D3DCCD1}">
+              <a14:hiddenFill xmlns:a14="http://schemas.microsoft.com/office/drawing/2010/main">
+                <a:solidFill>
+                  <a:srgbClr val="FFFFFF"/>
+                </a:solidFill>
+              </a14:hiddenFill>
+            </a:ext>
+          </a:extLst>
+        </p:spPr>
+      </p:pic>
     </p:spTree>
     <p:extLst>
       <p:ext uri="{BB962C8B-B14F-4D97-AF65-F5344CB8AC3E}">
@@ -7594,6 +7735,36 @@
           </a:p>
         </p:txBody>
       </p:sp>
+      <p:pic>
+        <p:nvPicPr>
+          <p:cNvPr id="4" name="Picture 3">
+            <a:extLst>
+              <a:ext uri="{FF2B5EF4-FFF2-40B4-BE49-F238E27FC236}">
+                <a16:creationId xmlns:a16="http://schemas.microsoft.com/office/drawing/2014/main" id="{21696ACF-C189-48FE-A2EE-CD856011FB90}"/>
+              </a:ext>
+            </a:extLst>
+          </p:cNvPr>
+          <p:cNvPicPr>
+            <a:picLocks noChangeAspect="1"/>
+          </p:cNvPicPr>
+          <p:nvPr/>
+        </p:nvPicPr>
+        <p:blipFill>
+          <a:blip r:embed="rId3"/>
+          <a:stretch>
+            <a:fillRect/>
+          </a:stretch>
+        </p:blipFill>
+        <p:spPr>
+          <a:xfrm>
+            <a:off x="5558413" y="2542232"/>
+            <a:ext cx="4895222" cy="2447611"/>
+          </a:xfrm>
+          <a:prstGeom prst="rect">
+            <a:avLst/>
+          </a:prstGeom>
+        </p:spPr>
+      </p:pic>
     </p:spTree>
     <p:extLst>
       <p:ext uri="{BB962C8B-B14F-4D97-AF65-F5344CB8AC3E}">

</xml_diff>